<commit_message>
Add Binding and Storage pages; update dependencies
- Modified `blazor_giorno_2.pptx` (binary changes not detailed).
- Updated `NavMenu.razor` to replace "Counter" with "Binding" and "Weather" with "Storage".
- Removed `Counter.razor` file.
- Added `Blazored.LocalStorage` and `Microsoft.AspNetCore.Components.WebAssembly.Authentication` to `BlazorForelApp.csproj`.
- Changed weather data source in `Weather.razor` to a URL endpoint.
- Updated `Program.cs` to include `Blazored.LocalStorage` and configure CORS.
- Added `BindingPage.razor` for demonstrating data binding techniques.
- Added `Storage.razor` to demonstrate local storage management using `Blazored.LocalStorage`.
</commit_message>
<xml_diff>
--- a/slides/blazor_giorno_2.pptx
+++ b/slides/blazor_giorno_2.pptx
@@ -5,10 +5,10 @@
     <p:sldMasterId id="2147483672" r:id="rId1"/>
   </p:sldMasterIdLst>
   <p:notesMasterIdLst>
-    <p:notesMasterId r:id="rId8"/>
+    <p:notesMasterId r:id="rId9"/>
   </p:notesMasterIdLst>
   <p:handoutMasterIdLst>
-    <p:handoutMasterId r:id="rId9"/>
+    <p:handoutMasterId r:id="rId10"/>
   </p:handoutMasterIdLst>
   <p:sldIdLst>
     <p:sldId id="256" r:id="rId2"/>
@@ -17,6 +17,7 @@
     <p:sldId id="264" r:id="rId5"/>
     <p:sldId id="265" r:id="rId6"/>
     <p:sldId id="266" r:id="rId7"/>
+    <p:sldId id="267" r:id="rId8"/>
   </p:sldIdLst>
   <p:sldSz cx="12192000" cy="6858000"/>
   <p:notesSz cx="6858000" cy="9144000"/>
@@ -5801,6 +5802,151 @@
     <p:extLst>
       <p:ext uri="{BB962C8B-B14F-4D97-AF65-F5344CB8AC3E}">
         <p14:creationId xmlns:p14="http://schemas.microsoft.com/office/powerpoint/2010/main" val="2818506233"/>
+      </p:ext>
+    </p:extLst>
+  </p:cSld>
+  <p:clrMapOvr>
+    <a:masterClrMapping/>
+  </p:clrMapOvr>
+</p:sld>
+</file>
+
+<file path=ppt/slides/slide7.xml><?xml version="1.0" encoding="utf-8"?>
+<p:sld xmlns:a="http://schemas.openxmlformats.org/drawingml/2006/main" xmlns:r="http://schemas.openxmlformats.org/officeDocument/2006/relationships" xmlns:p="http://schemas.openxmlformats.org/presentationml/2006/main">
+  <p:cSld>
+    <p:spTree>
+      <p:nvGrpSpPr>
+        <p:cNvPr id="1" name="">
+          <a:extLst>
+            <a:ext uri="{FF2B5EF4-FFF2-40B4-BE49-F238E27FC236}">
+              <a16:creationId xmlns:a16="http://schemas.microsoft.com/office/drawing/2014/main" id="{61F85459-2D91-41BB-28F2-8816602EB8A7}"/>
+            </a:ext>
+          </a:extLst>
+        </p:cNvPr>
+        <p:cNvGrpSpPr/>
+        <p:nvPr/>
+      </p:nvGrpSpPr>
+      <p:grpSpPr>
+        <a:xfrm>
+          <a:off x="0" y="0"/>
+          <a:ext cx="0" cy="0"/>
+          <a:chOff x="0" y="0"/>
+          <a:chExt cx="0" cy="0"/>
+        </a:xfrm>
+      </p:grpSpPr>
+      <p:sp>
+        <p:nvSpPr>
+          <p:cNvPr id="2" name="Titolo 1">
+            <a:extLst>
+              <a:ext uri="{FF2B5EF4-FFF2-40B4-BE49-F238E27FC236}">
+                <a16:creationId xmlns:a16="http://schemas.microsoft.com/office/drawing/2014/main" id="{9ADD4E25-9C77-E7A5-9ACD-2AF3A3F3AFCC}"/>
+              </a:ext>
+            </a:extLst>
+          </p:cNvPr>
+          <p:cNvSpPr>
+            <a:spLocks noGrp="1"/>
+          </p:cNvSpPr>
+          <p:nvPr>
+            <p:ph type="title"/>
+          </p:nvPr>
+        </p:nvSpPr>
+        <p:spPr/>
+        <p:txBody>
+          <a:bodyPr/>
+          <a:lstStyle/>
+          <a:p>
+            <a:r>
+              <a:rPr lang="en-US" b="1" dirty="0"/>
+              <a:t>Storage</a:t>
+            </a:r>
+            <a:endParaRPr lang="it-IT" dirty="0"/>
+          </a:p>
+        </p:txBody>
+      </p:sp>
+      <p:sp>
+        <p:nvSpPr>
+          <p:cNvPr id="5" name="Segnaposto contenuto 4">
+            <a:extLst>
+              <a:ext uri="{FF2B5EF4-FFF2-40B4-BE49-F238E27FC236}">
+                <a16:creationId xmlns:a16="http://schemas.microsoft.com/office/drawing/2014/main" id="{D5166B42-953E-85DC-682F-08C8C939C9D9}"/>
+              </a:ext>
+            </a:extLst>
+          </p:cNvPr>
+          <p:cNvSpPr>
+            <a:spLocks noGrp="1"/>
+          </p:cNvSpPr>
+          <p:nvPr>
+            <p:ph sz="half" idx="1"/>
+          </p:nvPr>
+        </p:nvSpPr>
+        <p:spPr/>
+        <p:txBody>
+          <a:bodyPr>
+            <a:normAutofit/>
+          </a:bodyPr>
+          <a:lstStyle/>
+          <a:p>
+            <a:r>
+              <a:rPr lang="it-IT" dirty="0" err="1"/>
+              <a:t>SessionStorage</a:t>
+            </a:r>
+            <a:endParaRPr lang="it-IT" dirty="0"/>
+          </a:p>
+          <a:p>
+            <a:r>
+              <a:rPr lang="it-IT" dirty="0" err="1"/>
+              <a:t>ProtectedSessionStore</a:t>
+            </a:r>
+            <a:endParaRPr lang="it-IT" dirty="0"/>
+          </a:p>
+          <a:p>
+            <a:r>
+              <a:rPr lang="it-IT" dirty="0" err="1"/>
+              <a:t>LocalStorage</a:t>
+            </a:r>
+            <a:endParaRPr lang="it-IT" dirty="0"/>
+          </a:p>
+          <a:p>
+            <a:r>
+              <a:rPr lang="it-IT" dirty="0" err="1"/>
+              <a:t>ProtectedLocalStore</a:t>
+            </a:r>
+            <a:endParaRPr lang="it-IT" dirty="0"/>
+          </a:p>
+          <a:p>
+            <a:endParaRPr lang="it-IT" dirty="0"/>
+          </a:p>
+        </p:txBody>
+      </p:sp>
+      <p:sp>
+        <p:nvSpPr>
+          <p:cNvPr id="4" name="Segnaposto contenuto 3">
+            <a:extLst>
+              <a:ext uri="{FF2B5EF4-FFF2-40B4-BE49-F238E27FC236}">
+                <a16:creationId xmlns:a16="http://schemas.microsoft.com/office/drawing/2014/main" id="{D812ECBB-91E8-7501-0C2C-CAE0FF82C15C}"/>
+              </a:ext>
+            </a:extLst>
+          </p:cNvPr>
+          <p:cNvSpPr>
+            <a:spLocks noGrp="1"/>
+          </p:cNvSpPr>
+          <p:nvPr>
+            <p:ph sz="half" idx="2"/>
+          </p:nvPr>
+        </p:nvSpPr>
+        <p:spPr/>
+        <p:txBody>
+          <a:bodyPr/>
+          <a:lstStyle/>
+          <a:p>
+            <a:endParaRPr lang="it-IT"/>
+          </a:p>
+        </p:txBody>
+      </p:sp>
+    </p:spTree>
+    <p:extLst>
+      <p:ext uri="{BB962C8B-B14F-4D97-AF65-F5344CB8AC3E}">
+        <p14:creationId xmlns:p14="http://schemas.microsoft.com/office/powerpoint/2010/main" val="2298701974"/>
       </p:ext>
     </p:extLst>
   </p:cSld>

</xml_diff>